<commit_message>
1-14-2015 update ppt deck
</commit_message>
<xml_diff>
--- a/lecture/CSE10101.pptx
+++ b/lecture/CSE10101.pptx
@@ -5,44 +5,46 @@
     <p:sldMasterId id="2147483660" r:id="rId1"/>
   </p:sldMasterIdLst>
   <p:notesMasterIdLst>
-    <p:notesMasterId r:id="rId37"/>
+    <p:notesMasterId r:id="rId39"/>
   </p:notesMasterIdLst>
   <p:sldIdLst>
     <p:sldId id="256" r:id="rId2"/>
     <p:sldId id="260" r:id="rId3"/>
     <p:sldId id="257" r:id="rId4"/>
-    <p:sldId id="259" r:id="rId5"/>
-    <p:sldId id="258" r:id="rId6"/>
-    <p:sldId id="261" r:id="rId7"/>
-    <p:sldId id="262" r:id="rId8"/>
-    <p:sldId id="263" r:id="rId9"/>
-    <p:sldId id="264" r:id="rId10"/>
-    <p:sldId id="265" r:id="rId11"/>
-    <p:sldId id="266" r:id="rId12"/>
-    <p:sldId id="267" r:id="rId13"/>
-    <p:sldId id="268" r:id="rId14"/>
-    <p:sldId id="269" r:id="rId15"/>
-    <p:sldId id="270" r:id="rId16"/>
-    <p:sldId id="271" r:id="rId17"/>
-    <p:sldId id="272" r:id="rId18"/>
-    <p:sldId id="273" r:id="rId19"/>
-    <p:sldId id="274" r:id="rId20"/>
-    <p:sldId id="275" r:id="rId21"/>
-    <p:sldId id="276" r:id="rId22"/>
-    <p:sldId id="279" r:id="rId23"/>
-    <p:sldId id="278" r:id="rId24"/>
-    <p:sldId id="277" r:id="rId25"/>
-    <p:sldId id="280" r:id="rId26"/>
-    <p:sldId id="281" r:id="rId27"/>
-    <p:sldId id="282" r:id="rId28"/>
-    <p:sldId id="283" r:id="rId29"/>
-    <p:sldId id="284" r:id="rId30"/>
-    <p:sldId id="285" r:id="rId31"/>
-    <p:sldId id="286" r:id="rId32"/>
-    <p:sldId id="287" r:id="rId33"/>
-    <p:sldId id="288" r:id="rId34"/>
-    <p:sldId id="289" r:id="rId35"/>
-    <p:sldId id="290" r:id="rId36"/>
+    <p:sldId id="258" r:id="rId5"/>
+    <p:sldId id="261" r:id="rId6"/>
+    <p:sldId id="262" r:id="rId7"/>
+    <p:sldId id="291" r:id="rId8"/>
+    <p:sldId id="259" r:id="rId9"/>
+    <p:sldId id="292" r:id="rId10"/>
+    <p:sldId id="263" r:id="rId11"/>
+    <p:sldId id="264" r:id="rId12"/>
+    <p:sldId id="265" r:id="rId13"/>
+    <p:sldId id="266" r:id="rId14"/>
+    <p:sldId id="267" r:id="rId15"/>
+    <p:sldId id="268" r:id="rId16"/>
+    <p:sldId id="269" r:id="rId17"/>
+    <p:sldId id="270" r:id="rId18"/>
+    <p:sldId id="271" r:id="rId19"/>
+    <p:sldId id="272" r:id="rId20"/>
+    <p:sldId id="273" r:id="rId21"/>
+    <p:sldId id="274" r:id="rId22"/>
+    <p:sldId id="275" r:id="rId23"/>
+    <p:sldId id="276" r:id="rId24"/>
+    <p:sldId id="279" r:id="rId25"/>
+    <p:sldId id="278" r:id="rId26"/>
+    <p:sldId id="277" r:id="rId27"/>
+    <p:sldId id="280" r:id="rId28"/>
+    <p:sldId id="281" r:id="rId29"/>
+    <p:sldId id="282" r:id="rId30"/>
+    <p:sldId id="283" r:id="rId31"/>
+    <p:sldId id="284" r:id="rId32"/>
+    <p:sldId id="285" r:id="rId33"/>
+    <p:sldId id="286" r:id="rId34"/>
+    <p:sldId id="287" r:id="rId35"/>
+    <p:sldId id="288" r:id="rId36"/>
+    <p:sldId id="289" r:id="rId37"/>
+    <p:sldId id="290" r:id="rId38"/>
   </p:sldIdLst>
   <p:sldSz cx="9144000" cy="6858000" type="screen4x3"/>
   <p:notesSz cx="6858000" cy="9144000"/>
@@ -643,7 +645,7 @@
           <a:p>
             <a:fld id="{A4F71BA7-982C-5744-B28F-8EF9F6462FED}" type="slidenum">
               <a:rPr lang="en-US" smtClean="0"/>
-              <a:t>10</a:t>
+              <a:t>12</a:t>
             </a:fld>
             <a:endParaRPr lang="en-US"/>
           </a:p>
@@ -727,7 +729,7 @@
           <a:p>
             <a:fld id="{A4F71BA7-982C-5744-B28F-8EF9F6462FED}" type="slidenum">
               <a:rPr lang="en-US" smtClean="0"/>
-              <a:t>11</a:t>
+              <a:t>13</a:t>
             </a:fld>
             <a:endParaRPr lang="en-US"/>
           </a:p>
@@ -811,7 +813,7 @@
           <a:p>
             <a:fld id="{A4F71BA7-982C-5744-B28F-8EF9F6462FED}" type="slidenum">
               <a:rPr lang="en-US" smtClean="0"/>
-              <a:t>12</a:t>
+              <a:t>14</a:t>
             </a:fld>
             <a:endParaRPr lang="en-US"/>
           </a:p>
@@ -895,7 +897,7 @@
           <a:p>
             <a:fld id="{A4F71BA7-982C-5744-B28F-8EF9F6462FED}" type="slidenum">
               <a:rPr lang="en-US" smtClean="0"/>
-              <a:t>13</a:t>
+              <a:t>15</a:t>
             </a:fld>
             <a:endParaRPr lang="en-US"/>
           </a:p>
@@ -979,7 +981,7 @@
           <a:p>
             <a:fld id="{A4F71BA7-982C-5744-B28F-8EF9F6462FED}" type="slidenum">
               <a:rPr lang="en-US" smtClean="0"/>
-              <a:t>14</a:t>
+              <a:t>16</a:t>
             </a:fld>
             <a:endParaRPr lang="en-US"/>
           </a:p>
@@ -1063,7 +1065,7 @@
           <a:p>
             <a:fld id="{A4F71BA7-982C-5744-B28F-8EF9F6462FED}" type="slidenum">
               <a:rPr lang="en-US" smtClean="0"/>
-              <a:t>15</a:t>
+              <a:t>17</a:t>
             </a:fld>
             <a:endParaRPr lang="en-US"/>
           </a:p>
@@ -1147,7 +1149,7 @@
           <a:p>
             <a:fld id="{A4F71BA7-982C-5744-B28F-8EF9F6462FED}" type="slidenum">
               <a:rPr lang="en-US" smtClean="0"/>
-              <a:t>16</a:t>
+              <a:t>18</a:t>
             </a:fld>
             <a:endParaRPr lang="en-US"/>
           </a:p>
@@ -1231,7 +1233,7 @@
           <a:p>
             <a:fld id="{A4F71BA7-982C-5744-B28F-8EF9F6462FED}" type="slidenum">
               <a:rPr lang="en-US" smtClean="0"/>
-              <a:t>17</a:t>
+              <a:t>19</a:t>
             </a:fld>
             <a:endParaRPr lang="en-US"/>
           </a:p>
@@ -1315,7 +1317,7 @@
           <a:p>
             <a:fld id="{A4F71BA7-982C-5744-B28F-8EF9F6462FED}" type="slidenum">
               <a:rPr lang="en-US" smtClean="0"/>
-              <a:t>18</a:t>
+              <a:t>20</a:t>
             </a:fld>
             <a:endParaRPr lang="en-US"/>
           </a:p>
@@ -1399,7 +1401,7 @@
           <a:p>
             <a:fld id="{A4F71BA7-982C-5744-B28F-8EF9F6462FED}" type="slidenum">
               <a:rPr lang="en-US" smtClean="0"/>
-              <a:t>19</a:t>
+              <a:t>21</a:t>
             </a:fld>
             <a:endParaRPr lang="en-US"/>
           </a:p>
@@ -1567,7 +1569,7 @@
           <a:p>
             <a:fld id="{A4F71BA7-982C-5744-B28F-8EF9F6462FED}" type="slidenum">
               <a:rPr lang="en-US" smtClean="0"/>
-              <a:t>20</a:t>
+              <a:t>22</a:t>
             </a:fld>
             <a:endParaRPr lang="en-US"/>
           </a:p>
@@ -1651,7 +1653,7 @@
           <a:p>
             <a:fld id="{A4F71BA7-982C-5744-B28F-8EF9F6462FED}" type="slidenum">
               <a:rPr lang="en-US" smtClean="0"/>
-              <a:t>21</a:t>
+              <a:t>23</a:t>
             </a:fld>
             <a:endParaRPr lang="en-US"/>
           </a:p>
@@ -1735,7 +1737,7 @@
           <a:p>
             <a:fld id="{A4F71BA7-982C-5744-B28F-8EF9F6462FED}" type="slidenum">
               <a:rPr lang="en-US" smtClean="0"/>
-              <a:t>22</a:t>
+              <a:t>24</a:t>
             </a:fld>
             <a:endParaRPr lang="en-US"/>
           </a:p>
@@ -1819,7 +1821,7 @@
           <a:p>
             <a:fld id="{A4F71BA7-982C-5744-B28F-8EF9F6462FED}" type="slidenum">
               <a:rPr lang="en-US" smtClean="0"/>
-              <a:t>23</a:t>
+              <a:t>25</a:t>
             </a:fld>
             <a:endParaRPr lang="en-US"/>
           </a:p>
@@ -1903,7 +1905,7 @@
           <a:p>
             <a:fld id="{A4F71BA7-982C-5744-B28F-8EF9F6462FED}" type="slidenum">
               <a:rPr lang="en-US" smtClean="0"/>
-              <a:t>24</a:t>
+              <a:t>26</a:t>
             </a:fld>
             <a:endParaRPr lang="en-US"/>
           </a:p>
@@ -1987,7 +1989,7 @@
           <a:p>
             <a:fld id="{A4F71BA7-982C-5744-B28F-8EF9F6462FED}" type="slidenum">
               <a:rPr lang="en-US" smtClean="0"/>
-              <a:t>25</a:t>
+              <a:t>27</a:t>
             </a:fld>
             <a:endParaRPr lang="en-US"/>
           </a:p>
@@ -2071,7 +2073,7 @@
           <a:p>
             <a:fld id="{A4F71BA7-982C-5744-B28F-8EF9F6462FED}" type="slidenum">
               <a:rPr lang="en-US" smtClean="0"/>
-              <a:t>26</a:t>
+              <a:t>28</a:t>
             </a:fld>
             <a:endParaRPr lang="en-US"/>
           </a:p>
@@ -2155,7 +2157,7 @@
           <a:p>
             <a:fld id="{A4F71BA7-982C-5744-B28F-8EF9F6462FED}" type="slidenum">
               <a:rPr lang="en-US" smtClean="0"/>
-              <a:t>27</a:t>
+              <a:t>29</a:t>
             </a:fld>
             <a:endParaRPr lang="en-US"/>
           </a:p>
@@ -2239,7 +2241,7 @@
           <a:p>
             <a:fld id="{A4F71BA7-982C-5744-B28F-8EF9F6462FED}" type="slidenum">
               <a:rPr lang="en-US" smtClean="0"/>
-              <a:t>28</a:t>
+              <a:t>30</a:t>
             </a:fld>
             <a:endParaRPr lang="en-US"/>
           </a:p>
@@ -2323,7 +2325,7 @@
           <a:p>
             <a:fld id="{A4F71BA7-982C-5744-B28F-8EF9F6462FED}" type="slidenum">
               <a:rPr lang="en-US" smtClean="0"/>
-              <a:t>29</a:t>
+              <a:t>31</a:t>
             </a:fld>
             <a:endParaRPr lang="en-US"/>
           </a:p>
@@ -2491,7 +2493,7 @@
           <a:p>
             <a:fld id="{A4F71BA7-982C-5744-B28F-8EF9F6462FED}" type="slidenum">
               <a:rPr lang="en-US" smtClean="0"/>
-              <a:t>30</a:t>
+              <a:t>32</a:t>
             </a:fld>
             <a:endParaRPr lang="en-US"/>
           </a:p>
@@ -2575,7 +2577,7 @@
           <a:p>
             <a:fld id="{A4F71BA7-982C-5744-B28F-8EF9F6462FED}" type="slidenum">
               <a:rPr lang="en-US" smtClean="0"/>
-              <a:t>31</a:t>
+              <a:t>33</a:t>
             </a:fld>
             <a:endParaRPr lang="en-US"/>
           </a:p>
@@ -2659,7 +2661,7 @@
           <a:p>
             <a:fld id="{A4F71BA7-982C-5744-B28F-8EF9F6462FED}" type="slidenum">
               <a:rPr lang="en-US" smtClean="0"/>
-              <a:t>32</a:t>
+              <a:t>34</a:t>
             </a:fld>
             <a:endParaRPr lang="en-US"/>
           </a:p>
@@ -2743,7 +2745,7 @@
           <a:p>
             <a:fld id="{A4F71BA7-982C-5744-B28F-8EF9F6462FED}" type="slidenum">
               <a:rPr lang="en-US" smtClean="0"/>
-              <a:t>33</a:t>
+              <a:t>35</a:t>
             </a:fld>
             <a:endParaRPr lang="en-US"/>
           </a:p>
@@ -2827,7 +2829,7 @@
           <a:p>
             <a:fld id="{A4F71BA7-982C-5744-B28F-8EF9F6462FED}" type="slidenum">
               <a:rPr lang="en-US" smtClean="0"/>
-              <a:t>34</a:t>
+              <a:t>36</a:t>
             </a:fld>
             <a:endParaRPr lang="en-US"/>
           </a:p>
@@ -2911,7 +2913,7 @@
           <a:p>
             <a:fld id="{A4F71BA7-982C-5744-B28F-8EF9F6462FED}" type="slidenum">
               <a:rPr lang="en-US" smtClean="0"/>
-              <a:t>35</a:t>
+              <a:t>37</a:t>
             </a:fld>
             <a:endParaRPr lang="en-US"/>
           </a:p>
@@ -2974,11 +2976,7 @@
           <a:bodyPr/>
           <a:lstStyle/>
           <a:p>
-            <a:r>
-              <a:rPr lang="en-US" dirty="0" smtClean="0"/>
-              <a:t>Choose the most correct answer
-https://www.polleverywhere.com/multiple_choice_polls/PofBeJJBRESzNHM</a:t>
-            </a:r>
+            <a:endParaRPr lang="en-US"/>
           </a:p>
         </p:txBody>
       </p:sp>
@@ -2997,18 +2995,18 @@
           <a:bodyPr/>
           <a:lstStyle/>
           <a:p>
-            <a:fld id="{1C4BCB7D-BF4E-1446-AA25-7CBBEE977063}" type="slidenum">
+            <a:fld id="{A4F71BA7-982C-5744-B28F-8EF9F6462FED}" type="slidenum">
               <a:rPr lang="en-US" smtClean="0"/>
               <a:t>4</a:t>
             </a:fld>
-            <a:endParaRPr lang="en-US" dirty="0"/>
+            <a:endParaRPr lang="en-US"/>
           </a:p>
         </p:txBody>
       </p:sp>
     </p:spTree>
     <p:extLst>
       <p:ext uri="{BB962C8B-B14F-4D97-AF65-F5344CB8AC3E}">
-        <p14:creationId xmlns:p14="http://schemas.microsoft.com/office/powerpoint/2010/main" val="1556872312"/>
+        <p14:creationId xmlns:p14="http://schemas.microsoft.com/office/powerpoint/2010/main" val="3034779097"/>
       </p:ext>
     </p:extLst>
   </p:cSld>
@@ -3092,7 +3090,7 @@
     </p:spTree>
     <p:extLst>
       <p:ext uri="{BB962C8B-B14F-4D97-AF65-F5344CB8AC3E}">
-        <p14:creationId xmlns:p14="http://schemas.microsoft.com/office/powerpoint/2010/main" val="3034779097"/>
+        <p14:creationId xmlns:p14="http://schemas.microsoft.com/office/powerpoint/2010/main" val="2137014325"/>
       </p:ext>
     </p:extLst>
   </p:cSld>
@@ -3176,7 +3174,7 @@
     </p:spTree>
     <p:extLst>
       <p:ext uri="{BB962C8B-B14F-4D97-AF65-F5344CB8AC3E}">
-        <p14:creationId xmlns:p14="http://schemas.microsoft.com/office/powerpoint/2010/main" val="2137014325"/>
+        <p14:creationId xmlns:p14="http://schemas.microsoft.com/office/powerpoint/2010/main" val="1932603725"/>
       </p:ext>
     </p:extLst>
   </p:cSld>
@@ -3230,7 +3228,11 @@
           <a:bodyPr/>
           <a:lstStyle/>
           <a:p>
-            <a:endParaRPr lang="en-US"/>
+            <a:r>
+              <a:rPr lang="en-US" dirty="0" smtClean="0"/>
+              <a:t>Choose the most correct answer
+https://www.polleverywhere.com/multiple_choice_polls/PofBeJJBRESzNHM</a:t>
+            </a:r>
           </a:p>
         </p:txBody>
       </p:sp>
@@ -3249,18 +3251,18 @@
           <a:bodyPr/>
           <a:lstStyle/>
           <a:p>
-            <a:fld id="{A4F71BA7-982C-5744-B28F-8EF9F6462FED}" type="slidenum">
+            <a:fld id="{1C4BCB7D-BF4E-1446-AA25-7CBBEE977063}" type="slidenum">
               <a:rPr lang="en-US" smtClean="0"/>
-              <a:t>7</a:t>
+              <a:t>8</a:t>
             </a:fld>
-            <a:endParaRPr lang="en-US"/>
+            <a:endParaRPr lang="en-US" dirty="0"/>
           </a:p>
         </p:txBody>
       </p:sp>
     </p:spTree>
     <p:extLst>
       <p:ext uri="{BB962C8B-B14F-4D97-AF65-F5344CB8AC3E}">
-        <p14:creationId xmlns:p14="http://schemas.microsoft.com/office/powerpoint/2010/main" val="1932603725"/>
+        <p14:creationId xmlns:p14="http://schemas.microsoft.com/office/powerpoint/2010/main" val="1556872312"/>
       </p:ext>
     </p:extLst>
   </p:cSld>
@@ -3335,7 +3337,7 @@
           <a:p>
             <a:fld id="{A4F71BA7-982C-5744-B28F-8EF9F6462FED}" type="slidenum">
               <a:rPr lang="en-US" smtClean="0"/>
-              <a:t>8</a:t>
+              <a:t>10</a:t>
             </a:fld>
             <a:endParaRPr lang="en-US"/>
           </a:p>
@@ -3419,7 +3421,7 @@
           <a:p>
             <a:fld id="{A4F71BA7-982C-5744-B28F-8EF9F6462FED}" type="slidenum">
               <a:rPr lang="en-US" smtClean="0"/>
-              <a:t>9</a:t>
+              <a:t>11</a:t>
             </a:fld>
             <a:endParaRPr lang="en-US"/>
           </a:p>
@@ -7117,21 +7119,13 @@
         <p:spPr/>
         <p:txBody>
           <a:bodyPr>
-            <a:normAutofit fontScale="90000"/>
+            <a:normAutofit/>
           </a:bodyPr>
           <a:lstStyle/>
           <a:p>
             <a:r>
               <a:rPr lang="en-US" dirty="0" smtClean="0"/>
-              <a:t>1/27: St. Angela </a:t>
-            </a:r>
-            <a:r>
-              <a:rPr lang="en-US" dirty="0" err="1" smtClean="0"/>
-              <a:t>Merici</a:t>
-            </a:r>
-            <a:r>
-              <a:rPr lang="en-US" dirty="0" smtClean="0"/>
-              <a:t>, founder of Company of St. Ursula (first women’s teaching order)</a:t>
+              <a:t>1/20: Feast of St. Fabian, Pope and martyr</a:t>
             </a:r>
             <a:endParaRPr lang="en-US" dirty="0"/>
           </a:p>
@@ -7152,14 +7146,14 @@
           <a:bodyPr/>
           <a:lstStyle/>
           <a:p>
-            <a:endParaRPr lang="en-US"/>
+            <a:endParaRPr lang="en-US" dirty="0"/>
           </a:p>
         </p:txBody>
       </p:sp>
     </p:spTree>
     <p:extLst>
       <p:ext uri="{BB962C8B-B14F-4D97-AF65-F5344CB8AC3E}">
-        <p14:creationId xmlns:p14="http://schemas.microsoft.com/office/powerpoint/2010/main" val="1672196243"/>
+        <p14:creationId xmlns:p14="http://schemas.microsoft.com/office/powerpoint/2010/main" val="4090544002"/>
       </p:ext>
     </p:extLst>
   </p:cSld>
@@ -7203,14 +7197,7 @@
           <a:p>
             <a:r>
               <a:rPr lang="en-US" dirty="0" smtClean="0"/>
-              <a:t>1/29: (no feast)</a:t>
-            </a:r>
-            <a:br>
-              <a:rPr lang="en-US" dirty="0" smtClean="0"/>
-            </a:br>
-            <a:r>
-              <a:rPr lang="en-US" dirty="0" smtClean="0"/>
-              <a:t>SG, Bro. Juniper</a:t>
+              <a:t>1/22: St. Vincent, martyr</a:t>
             </a:r>
             <a:endParaRPr lang="en-US" dirty="0"/>
           </a:p>
@@ -7238,7 +7225,7 @@
     </p:spTree>
     <p:extLst>
       <p:ext uri="{BB962C8B-B14F-4D97-AF65-F5344CB8AC3E}">
-        <p14:creationId xmlns:p14="http://schemas.microsoft.com/office/powerpoint/2010/main" val="1333386826"/>
+        <p14:creationId xmlns:p14="http://schemas.microsoft.com/office/powerpoint/2010/main" val="167858628"/>
       </p:ext>
     </p:extLst>
   </p:cSld>
@@ -7277,28 +7264,22 @@
         </p:nvSpPr>
         <p:spPr/>
         <p:txBody>
-          <a:bodyPr/>
+          <a:bodyPr>
+            <a:normAutofit fontScale="90000"/>
+          </a:bodyPr>
           <a:lstStyle/>
           <a:p>
             <a:r>
               <a:rPr lang="en-US" dirty="0" smtClean="0"/>
-              <a:t>2/3: St. </a:t>
+              <a:t>1/27: St. Angela </a:t>
             </a:r>
             <a:r>
               <a:rPr lang="en-US" dirty="0" err="1" smtClean="0"/>
-              <a:t>Blase</a:t>
+              <a:t>Merici</a:t>
             </a:r>
             <a:r>
               <a:rPr lang="en-US" dirty="0" smtClean="0"/>
-              <a:t>, </a:t>
-            </a:r>
-            <a:r>
-              <a:rPr lang="en-US" dirty="0" err="1" smtClean="0"/>
-              <a:t>patrom</a:t>
-            </a:r>
-            <a:r>
-              <a:rPr lang="en-US" dirty="0" smtClean="0"/>
-              <a:t> saint of those with throat ailments</a:t>
+              <a:t>, founder of Company of St. Ursula (first women’s teaching order)</a:t>
             </a:r>
             <a:endParaRPr lang="en-US" dirty="0"/>
           </a:p>
@@ -7326,7 +7307,7 @@
     </p:spTree>
     <p:extLst>
       <p:ext uri="{BB962C8B-B14F-4D97-AF65-F5344CB8AC3E}">
-        <p14:creationId xmlns:p14="http://schemas.microsoft.com/office/powerpoint/2010/main" val="3792738818"/>
+        <p14:creationId xmlns:p14="http://schemas.microsoft.com/office/powerpoint/2010/main" val="1672196243"/>
       </p:ext>
     </p:extLst>
   </p:cSld>
@@ -7365,14 +7346,19 @@
         </p:nvSpPr>
         <p:spPr/>
         <p:txBody>
-          <a:bodyPr>
-            <a:normAutofit fontScale="90000"/>
-          </a:bodyPr>
+          <a:bodyPr/>
           <a:lstStyle/>
           <a:p>
             <a:r>
               <a:rPr lang="en-US" dirty="0" smtClean="0"/>
-              <a:t>2/5: St. Agatha, patron saint of foundry workers and Alpine guides</a:t>
+              <a:t>1/29: (no feast)</a:t>
+            </a:r>
+            <a:br>
+              <a:rPr lang="en-US" dirty="0" smtClean="0"/>
+            </a:br>
+            <a:r>
+              <a:rPr lang="en-US" dirty="0" smtClean="0"/>
+              <a:t>SG, Bro. Juniper</a:t>
             </a:r>
             <a:endParaRPr lang="en-US" dirty="0"/>
           </a:p>
@@ -7400,7 +7386,7 @@
     </p:spTree>
     <p:extLst>
       <p:ext uri="{BB962C8B-B14F-4D97-AF65-F5344CB8AC3E}">
-        <p14:creationId xmlns:p14="http://schemas.microsoft.com/office/powerpoint/2010/main" val="4150022616"/>
+        <p14:creationId xmlns:p14="http://schemas.microsoft.com/office/powerpoint/2010/main" val="1333386826"/>
       </p:ext>
     </p:extLst>
   </p:cSld>
@@ -7439,30 +7425,28 @@
         </p:nvSpPr>
         <p:spPr/>
         <p:txBody>
-          <a:bodyPr>
-            <a:normAutofit fontScale="90000"/>
-          </a:bodyPr>
+          <a:bodyPr/>
           <a:lstStyle/>
           <a:p>
             <a:r>
               <a:rPr lang="en-US" dirty="0" smtClean="0"/>
-              <a:t>2/10: St. </a:t>
+              <a:t>2/3: St. </a:t>
             </a:r>
             <a:r>
               <a:rPr lang="en-US" dirty="0" err="1" smtClean="0"/>
-              <a:t>Scholastica</a:t>
+              <a:t>Blase</a:t>
             </a:r>
             <a:r>
               <a:rPr lang="en-US" dirty="0" smtClean="0"/>
-              <a:t>, patron saint of nuns, and twin sister of St. </a:t>
-            </a:r>
-            <a:r>
-              <a:rPr lang="en-US" dirty="0"/>
-              <a:t>B</a:t>
+              <a:t>, </a:t>
+            </a:r>
+            <a:r>
+              <a:rPr lang="en-US" dirty="0" err="1" smtClean="0"/>
+              <a:t>patrom</a:t>
             </a:r>
             <a:r>
               <a:rPr lang="en-US" dirty="0" smtClean="0"/>
-              <a:t>enedict</a:t>
+              <a:t> saint of those with throat ailments</a:t>
             </a:r>
             <a:endParaRPr lang="en-US" dirty="0"/>
           </a:p>
@@ -7490,7 +7474,7 @@
     </p:spTree>
     <p:extLst>
       <p:ext uri="{BB962C8B-B14F-4D97-AF65-F5344CB8AC3E}">
-        <p14:creationId xmlns:p14="http://schemas.microsoft.com/office/powerpoint/2010/main" val="3701421898"/>
+        <p14:creationId xmlns:p14="http://schemas.microsoft.com/office/powerpoint/2010/main" val="3792738818"/>
       </p:ext>
     </p:extLst>
   </p:cSld>
@@ -7536,22 +7520,7 @@
           <a:p>
             <a:r>
               <a:rPr lang="en-US" dirty="0" smtClean="0"/>
-              <a:t>2/12: (no feast)</a:t>
-            </a:r>
-            <a:br>
-              <a:rPr lang="en-US" dirty="0" smtClean="0"/>
-            </a:br>
-            <a:r>
-              <a:rPr lang="en-US" dirty="0" smtClean="0"/>
-              <a:t>St. </a:t>
-            </a:r>
-            <a:r>
-              <a:rPr lang="en-US" dirty="0" err="1" smtClean="0"/>
-              <a:t>Apollonia</a:t>
-            </a:r>
-            <a:r>
-              <a:rPr lang="en-US" dirty="0" smtClean="0"/>
-              <a:t>, patron saint of dentists</a:t>
+              <a:t>2/5: St. Agatha, patron saint of foundry workers and Alpine guides</a:t>
             </a:r>
             <a:endParaRPr lang="en-US" dirty="0"/>
           </a:p>
@@ -7579,7 +7548,7 @@
     </p:spTree>
     <p:extLst>
       <p:ext uri="{BB962C8B-B14F-4D97-AF65-F5344CB8AC3E}">
-        <p14:creationId xmlns:p14="http://schemas.microsoft.com/office/powerpoint/2010/main" val="3429388848"/>
+        <p14:creationId xmlns:p14="http://schemas.microsoft.com/office/powerpoint/2010/main" val="4150022616"/>
       </p:ext>
     </p:extLst>
   </p:cSld>
@@ -7618,16 +7587,30 @@
         </p:nvSpPr>
         <p:spPr/>
         <p:txBody>
-          <a:bodyPr/>
+          <a:bodyPr>
+            <a:normAutofit fontScale="90000"/>
+          </a:bodyPr>
           <a:lstStyle/>
           <a:p>
             <a:r>
               <a:rPr lang="en-US" dirty="0" smtClean="0"/>
-              <a:t>2/17: Blessed Luke </a:t>
+              <a:t>2/10: St. </a:t>
             </a:r>
             <a:r>
               <a:rPr lang="en-US" dirty="0" err="1" smtClean="0"/>
-              <a:t>Belludi</a:t>
+              <a:t>Scholastica</a:t>
+            </a:r>
+            <a:r>
+              <a:rPr lang="en-US" dirty="0" smtClean="0"/>
+              <a:t>, patron saint of nuns, and twin sister of St. </a:t>
+            </a:r>
+            <a:r>
+              <a:rPr lang="en-US" dirty="0"/>
+              <a:t>B</a:t>
+            </a:r>
+            <a:r>
+              <a:rPr lang="en-US" dirty="0" smtClean="0"/>
+              <a:t>enedict</a:t>
             </a:r>
             <a:endParaRPr lang="en-US" dirty="0"/>
           </a:p>
@@ -7655,7 +7638,7 @@
     </p:spTree>
     <p:extLst>
       <p:ext uri="{BB962C8B-B14F-4D97-AF65-F5344CB8AC3E}">
-        <p14:creationId xmlns:p14="http://schemas.microsoft.com/office/powerpoint/2010/main" val="3170198590"/>
+        <p14:creationId xmlns:p14="http://schemas.microsoft.com/office/powerpoint/2010/main" val="3701421898"/>
       </p:ext>
     </p:extLst>
   </p:cSld>
@@ -7694,12 +7677,29 @@
         </p:nvSpPr>
         <p:spPr/>
         <p:txBody>
-          <a:bodyPr/>
+          <a:bodyPr>
+            <a:normAutofit fontScale="90000"/>
+          </a:bodyPr>
           <a:lstStyle/>
           <a:p>
             <a:r>
               <a:rPr lang="en-US" dirty="0" smtClean="0"/>
-              <a:t>2/19: St. Conrad of Piacenza, hermit</a:t>
+              <a:t>2/12: (no feast)</a:t>
+            </a:r>
+            <a:br>
+              <a:rPr lang="en-US" dirty="0" smtClean="0"/>
+            </a:br>
+            <a:r>
+              <a:rPr lang="en-US" dirty="0" smtClean="0"/>
+              <a:t>St. </a:t>
+            </a:r>
+            <a:r>
+              <a:rPr lang="en-US" dirty="0" err="1" smtClean="0"/>
+              <a:t>Apollonia</a:t>
+            </a:r>
+            <a:r>
+              <a:rPr lang="en-US" dirty="0" smtClean="0"/>
+              <a:t>, patron saint of dentists</a:t>
             </a:r>
             <a:endParaRPr lang="en-US" dirty="0"/>
           </a:p>
@@ -7727,7 +7727,7 @@
     </p:spTree>
     <p:extLst>
       <p:ext uri="{BB962C8B-B14F-4D97-AF65-F5344CB8AC3E}">
-        <p14:creationId xmlns:p14="http://schemas.microsoft.com/office/powerpoint/2010/main" val="1003366174"/>
+        <p14:creationId xmlns:p14="http://schemas.microsoft.com/office/powerpoint/2010/main" val="3429388848"/>
       </p:ext>
     </p:extLst>
   </p:cSld>
@@ -7771,7 +7771,11 @@
           <a:p>
             <a:r>
               <a:rPr lang="en-US" dirty="0" smtClean="0"/>
-              <a:t>2/24: no feast</a:t>
+              <a:t>2/17: Blessed Luke </a:t>
+            </a:r>
+            <a:r>
+              <a:rPr lang="en-US" dirty="0" err="1" smtClean="0"/>
+              <a:t>Belludi</a:t>
             </a:r>
             <a:endParaRPr lang="en-US" dirty="0"/>
           </a:p>
@@ -7799,7 +7803,7 @@
     </p:spTree>
     <p:extLst>
       <p:ext uri="{BB962C8B-B14F-4D97-AF65-F5344CB8AC3E}">
-        <p14:creationId xmlns:p14="http://schemas.microsoft.com/office/powerpoint/2010/main" val="2906380244"/>
+        <p14:creationId xmlns:p14="http://schemas.microsoft.com/office/powerpoint/2010/main" val="3170198590"/>
       </p:ext>
     </p:extLst>
   </p:cSld>
@@ -7843,15 +7847,7 @@
           <a:p>
             <a:r>
               <a:rPr lang="en-US" dirty="0" smtClean="0"/>
-              <a:t>2/26</a:t>
-            </a:r>
-            <a:r>
-              <a:rPr lang="en-US" dirty="0"/>
-              <a:t>: St. Porphyry of </a:t>
-            </a:r>
-            <a:r>
-              <a:rPr lang="en-US" dirty="0" smtClean="0"/>
-              <a:t>Gaza, ascetic</a:t>
+              <a:t>2/19: St. Conrad of Piacenza, hermit</a:t>
             </a:r>
             <a:endParaRPr lang="en-US" dirty="0"/>
           </a:p>
@@ -7879,7 +7875,7 @@
     </p:spTree>
     <p:extLst>
       <p:ext uri="{BB962C8B-B14F-4D97-AF65-F5344CB8AC3E}">
-        <p14:creationId xmlns:p14="http://schemas.microsoft.com/office/powerpoint/2010/main" val="511685430"/>
+        <p14:creationId xmlns:p14="http://schemas.microsoft.com/office/powerpoint/2010/main" val="1003366174"/>
       </p:ext>
     </p:extLst>
   </p:cSld>
@@ -7929,22 +7925,14 @@
             </a:r>
             <a:r>
               <a:rPr lang="en-US" dirty="0" smtClean="0"/>
-              <a:t>Doctor of the Church </a:t>
-            </a:r>
-            <a:r>
-              <a:rPr lang="en-US" smtClean="0"/>
-              <a:t>(and patron </a:t>
+              <a:t>Doctor of the Church (and patron </a:t>
             </a:r>
             <a:r>
               <a:rPr lang="en-US" dirty="0" smtClean="0"/>
-              <a:t>against </a:t>
-            </a:r>
-            <a:r>
-              <a:rPr lang="en-US" smtClean="0"/>
-              <a:t>snake </a:t>
-            </a:r>
-            <a:r>
-              <a:rPr lang="en-US" smtClean="0"/>
+              <a:t>against snake </a:t>
+            </a:r>
+            <a:r>
+              <a:rPr lang="en-US" dirty="0" smtClean="0"/>
               <a:t>bites)</a:t>
             </a:r>
             <a:endParaRPr lang="en-US" dirty="0"/>
@@ -8019,14 +8007,12 @@
         </p:nvSpPr>
         <p:spPr/>
         <p:txBody>
-          <a:bodyPr>
-            <a:normAutofit fontScale="90000"/>
-          </a:bodyPr>
+          <a:bodyPr/>
           <a:lstStyle/>
           <a:p>
             <a:r>
               <a:rPr lang="en-US" dirty="0" smtClean="0"/>
-              <a:t>3/3: St. Catherine Drexel (founder of Xavier Univ. in New Orleans)</a:t>
+              <a:t>2/24: no feast</a:t>
             </a:r>
             <a:endParaRPr lang="en-US" dirty="0"/>
           </a:p>
@@ -8054,7 +8040,7 @@
     </p:spTree>
     <p:extLst>
       <p:ext uri="{BB962C8B-B14F-4D97-AF65-F5344CB8AC3E}">
-        <p14:creationId xmlns:p14="http://schemas.microsoft.com/office/powerpoint/2010/main" val="3542190715"/>
+        <p14:creationId xmlns:p14="http://schemas.microsoft.com/office/powerpoint/2010/main" val="2906380244"/>
       </p:ext>
     </p:extLst>
   </p:cSld>
@@ -8098,7 +8084,15 @@
           <a:p>
             <a:r>
               <a:rPr lang="en-US" dirty="0" smtClean="0"/>
-              <a:t>3/5: St. John Joseph of the Cross (noted ascetic)</a:t>
+              <a:t>2/26</a:t>
+            </a:r>
+            <a:r>
+              <a:rPr lang="en-US" dirty="0"/>
+              <a:t>: St. Porphyry of </a:t>
+            </a:r>
+            <a:r>
+              <a:rPr lang="en-US" dirty="0" smtClean="0"/>
+              <a:t>Gaza, ascetic</a:t>
             </a:r>
             <a:endParaRPr lang="en-US" dirty="0"/>
           </a:p>
@@ -8126,7 +8120,7 @@
     </p:spTree>
     <p:extLst>
       <p:ext uri="{BB962C8B-B14F-4D97-AF65-F5344CB8AC3E}">
-        <p14:creationId xmlns:p14="http://schemas.microsoft.com/office/powerpoint/2010/main" val="3432528883"/>
+        <p14:creationId xmlns:p14="http://schemas.microsoft.com/office/powerpoint/2010/main" val="511685430"/>
       </p:ext>
     </p:extLst>
   </p:cSld>
@@ -8165,12 +8159,14 @@
         </p:nvSpPr>
         <p:spPr/>
         <p:txBody>
-          <a:bodyPr/>
+          <a:bodyPr>
+            <a:normAutofit fontScale="90000"/>
+          </a:bodyPr>
           <a:lstStyle/>
           <a:p>
             <a:r>
               <a:rPr lang="en-US" dirty="0" smtClean="0"/>
-              <a:t>3/17: DUH</a:t>
+              <a:t>3/3: St. Catherine Drexel (founder of Xavier Univ. in New Orleans)</a:t>
             </a:r>
             <a:endParaRPr lang="en-US" dirty="0"/>
           </a:p>
@@ -8198,20 +8194,13 @@
     </p:spTree>
     <p:extLst>
       <p:ext uri="{BB962C8B-B14F-4D97-AF65-F5344CB8AC3E}">
-        <p14:creationId xmlns:p14="http://schemas.microsoft.com/office/powerpoint/2010/main" val="3308095904"/>
+        <p14:creationId xmlns:p14="http://schemas.microsoft.com/office/powerpoint/2010/main" val="3542190715"/>
       </p:ext>
     </p:extLst>
   </p:cSld>
   <p:clrMapOvr>
     <a:masterClrMapping/>
   </p:clrMapOvr>
-  <p:timing>
-    <p:tnLst>
-      <p:par>
-        <p:cTn xmlns:p14="http://schemas.microsoft.com/office/powerpoint/2010/main" id="1" dur="indefinite" restart="never" nodeType="tmRoot"/>
-      </p:par>
-    </p:tnLst>
-  </p:timing>
 </p:sld>
 </file>
 
@@ -8234,7 +8223,7 @@
       </p:grpSpPr>
       <p:sp>
         <p:nvSpPr>
-          <p:cNvPr id="4" name="Title 3"/>
+          <p:cNvPr id="2" name="Title 1"/>
           <p:cNvSpPr>
             <a:spLocks noGrp="1"/>
           </p:cNvSpPr>
@@ -8247,85 +8236,43 @@
           <a:bodyPr/>
           <a:lstStyle/>
           <a:p>
-            <a:endParaRPr lang="en-US"/>
-          </a:p>
-        </p:txBody>
-      </p:sp>
-      <p:pic>
-        <p:nvPicPr>
-          <p:cNvPr id="6" name="Content Placeholder 5"/>
-          <p:cNvPicPr>
-            <a:picLocks noGrp="1" noChangeAspect="1"/>
-          </p:cNvPicPr>
-          <p:nvPr>
-            <p:ph idx="1"/>
-          </p:nvPr>
-        </p:nvPicPr>
-        <p:blipFill rotWithShape="1">
-          <a:blip r:embed="rId3"/>
-          <a:srcRect l="-319" r="-585"/>
-          <a:stretch/>
-        </p:blipFill>
-        <p:spPr>
-          <a:xfrm>
-            <a:off x="0" y="-49615"/>
-            <a:ext cx="7339478" cy="6934515"/>
-          </a:xfrm>
-        </p:spPr>
-      </p:pic>
-      <p:sp>
-        <p:nvSpPr>
-          <p:cNvPr id="7" name="Rectangle 6"/>
-          <p:cNvSpPr/>
-          <p:nvPr/>
-        </p:nvSpPr>
-        <p:spPr>
-          <a:xfrm>
-            <a:off x="5625088" y="6488668"/>
-            <a:ext cx="3518912" cy="369332"/>
-          </a:xfrm>
-          <a:prstGeom prst="rect">
-            <a:avLst/>
-          </a:prstGeom>
-        </p:spPr>
-        <p:txBody>
-          <a:bodyPr wrap="none">
-            <a:spAutoFit/>
-          </a:bodyPr>
-          <a:lstStyle/>
-          <a:p>
-            <a:r>
-              <a:rPr lang="en-US" dirty="0"/>
-              <a:t>http://</a:t>
-            </a:r>
-            <a:r>
-              <a:rPr lang="en-US" dirty="0" err="1"/>
-              <a:t>shamrocktechnologies.net</a:t>
-            </a:r>
-            <a:r>
-              <a:rPr lang="en-US" dirty="0"/>
-              <a:t>/</a:t>
-            </a:r>
+            <a:r>
+              <a:rPr lang="en-US" dirty="0" smtClean="0"/>
+              <a:t>3/5: St. John Joseph of the Cross (noted ascetic)</a:t>
+            </a:r>
+            <a:endParaRPr lang="en-US" dirty="0"/>
+          </a:p>
+        </p:txBody>
+      </p:sp>
+      <p:sp>
+        <p:nvSpPr>
+          <p:cNvPr id="3" name="Text Placeholder 2"/>
+          <p:cNvSpPr>
+            <a:spLocks noGrp="1"/>
+          </p:cNvSpPr>
+          <p:nvPr>
+            <p:ph type="body" idx="1"/>
+          </p:nvPr>
+        </p:nvSpPr>
+        <p:spPr/>
+        <p:txBody>
+          <a:bodyPr/>
+          <a:lstStyle/>
+          <a:p>
+            <a:endParaRPr lang="en-US"/>
           </a:p>
         </p:txBody>
       </p:sp>
     </p:spTree>
     <p:extLst>
       <p:ext uri="{BB962C8B-B14F-4D97-AF65-F5344CB8AC3E}">
-        <p14:creationId xmlns:p14="http://schemas.microsoft.com/office/powerpoint/2010/main" val="3582435598"/>
+        <p14:creationId xmlns:p14="http://schemas.microsoft.com/office/powerpoint/2010/main" val="3432528883"/>
       </p:ext>
     </p:extLst>
   </p:cSld>
   <p:clrMapOvr>
     <a:masterClrMapping/>
   </p:clrMapOvr>
-  <p:timing>
-    <p:tnLst>
-      <p:par>
-        <p:cTn xmlns:p14="http://schemas.microsoft.com/office/powerpoint/2010/main" id="1" dur="indefinite" restart="never" nodeType="tmRoot"/>
-      </p:par>
-    </p:tnLst>
-  </p:timing>
 </p:sld>
 </file>
 
@@ -8358,14 +8305,12 @@
         </p:nvSpPr>
         <p:spPr/>
         <p:txBody>
-          <a:bodyPr>
-            <a:normAutofit fontScale="90000"/>
-          </a:bodyPr>
+          <a:bodyPr/>
           <a:lstStyle/>
           <a:p>
             <a:r>
               <a:rPr lang="en-US" dirty="0" smtClean="0"/>
-              <a:t>3/19: St. Joseph, husband of Mary and patron of Belgium, fathers, Happy Death, and Peru (among others)</a:t>
+              <a:t>3/17: DUH</a:t>
             </a:r>
             <a:endParaRPr lang="en-US" dirty="0"/>
           </a:p>
@@ -8393,7 +8338,7 @@
     </p:spTree>
     <p:extLst>
       <p:ext uri="{BB962C8B-B14F-4D97-AF65-F5344CB8AC3E}">
-        <p14:creationId xmlns:p14="http://schemas.microsoft.com/office/powerpoint/2010/main" val="1280791579"/>
+        <p14:creationId xmlns:p14="http://schemas.microsoft.com/office/powerpoint/2010/main" val="3308095904"/>
       </p:ext>
     </p:extLst>
   </p:cSld>
@@ -8429,7 +8374,7 @@
       </p:grpSpPr>
       <p:sp>
         <p:nvSpPr>
-          <p:cNvPr id="2" name="Title 1"/>
+          <p:cNvPr id="4" name="Title 3"/>
           <p:cNvSpPr>
             <a:spLocks noGrp="1"/>
           </p:cNvSpPr>
@@ -8442,43 +8387,85 @@
           <a:bodyPr/>
           <a:lstStyle/>
           <a:p>
-            <a:r>
-              <a:rPr lang="en-US" dirty="0" smtClean="0"/>
-              <a:t>3/24: St. Catherine of Genoa</a:t>
-            </a:r>
-            <a:endParaRPr lang="en-US" dirty="0"/>
-          </a:p>
-        </p:txBody>
-      </p:sp>
-      <p:sp>
-        <p:nvSpPr>
-          <p:cNvPr id="3" name="Text Placeholder 2"/>
-          <p:cNvSpPr>
-            <a:spLocks noGrp="1"/>
-          </p:cNvSpPr>
-          <p:nvPr>
-            <p:ph type="body" idx="1"/>
-          </p:nvPr>
-        </p:nvSpPr>
-        <p:spPr/>
-        <p:txBody>
-          <a:bodyPr/>
-          <a:lstStyle/>
-          <a:p>
-            <a:endParaRPr lang="en-US"/>
+            <a:endParaRPr lang="en-US"/>
+          </a:p>
+        </p:txBody>
+      </p:sp>
+      <p:pic>
+        <p:nvPicPr>
+          <p:cNvPr id="6" name="Content Placeholder 5"/>
+          <p:cNvPicPr>
+            <a:picLocks noGrp="1" noChangeAspect="1"/>
+          </p:cNvPicPr>
+          <p:nvPr>
+            <p:ph idx="1"/>
+          </p:nvPr>
+        </p:nvPicPr>
+        <p:blipFill rotWithShape="1">
+          <a:blip r:embed="rId3"/>
+          <a:srcRect l="-319" r="-585"/>
+          <a:stretch/>
+        </p:blipFill>
+        <p:spPr>
+          <a:xfrm>
+            <a:off x="0" y="-49615"/>
+            <a:ext cx="7339478" cy="6934515"/>
+          </a:xfrm>
+        </p:spPr>
+      </p:pic>
+      <p:sp>
+        <p:nvSpPr>
+          <p:cNvPr id="7" name="Rectangle 6"/>
+          <p:cNvSpPr/>
+          <p:nvPr/>
+        </p:nvSpPr>
+        <p:spPr>
+          <a:xfrm>
+            <a:off x="5625088" y="6488668"/>
+            <a:ext cx="3518912" cy="369332"/>
+          </a:xfrm>
+          <a:prstGeom prst="rect">
+            <a:avLst/>
+          </a:prstGeom>
+        </p:spPr>
+        <p:txBody>
+          <a:bodyPr wrap="none">
+            <a:spAutoFit/>
+          </a:bodyPr>
+          <a:lstStyle/>
+          <a:p>
+            <a:r>
+              <a:rPr lang="en-US" dirty="0"/>
+              <a:t>http://</a:t>
+            </a:r>
+            <a:r>
+              <a:rPr lang="en-US" dirty="0" err="1"/>
+              <a:t>shamrocktechnologies.net</a:t>
+            </a:r>
+            <a:r>
+              <a:rPr lang="en-US" dirty="0"/>
+              <a:t>/</a:t>
+            </a:r>
           </a:p>
         </p:txBody>
       </p:sp>
     </p:spTree>
     <p:extLst>
       <p:ext uri="{BB962C8B-B14F-4D97-AF65-F5344CB8AC3E}">
-        <p14:creationId xmlns:p14="http://schemas.microsoft.com/office/powerpoint/2010/main" val="1009385447"/>
+        <p14:creationId xmlns:p14="http://schemas.microsoft.com/office/powerpoint/2010/main" val="3582435598"/>
       </p:ext>
     </p:extLst>
   </p:cSld>
   <p:clrMapOvr>
     <a:masterClrMapping/>
   </p:clrMapOvr>
+  <p:timing>
+    <p:tnLst>
+      <p:par>
+        <p:cTn xmlns:p14="http://schemas.microsoft.com/office/powerpoint/2010/main" id="1" dur="indefinite" restart="never" nodeType="tmRoot"/>
+      </p:par>
+    </p:tnLst>
+  </p:timing>
 </p:sld>
 </file>
 
@@ -8517,31 +8504,8 @@
           <a:lstStyle/>
           <a:p>
             <a:r>
-              <a:rPr lang="en-US" dirty="0"/>
-              <a:t>3/26: </a:t>
-            </a:r>
-            <a:r>
               <a:rPr lang="en-US" dirty="0" smtClean="0"/>
-              <a:t>(no feast)</a:t>
-            </a:r>
-            <a:br>
-              <a:rPr lang="en-US" dirty="0" smtClean="0"/>
-            </a:br>
-            <a:r>
-              <a:rPr lang="en-US" dirty="0" smtClean="0"/>
-              <a:t>Blessed </a:t>
-            </a:r>
-            <a:r>
-              <a:rPr lang="en-US" dirty="0" err="1"/>
-              <a:t>Didacus</a:t>
-            </a:r>
-            <a:r>
-              <a:rPr lang="en-US" dirty="0"/>
-              <a:t> Joseph of </a:t>
-            </a:r>
-            <a:r>
-              <a:rPr lang="en-US" dirty="0" smtClean="0"/>
-              <a:t>Cadiz, preacher</a:t>
+              <a:t>3/19: St. Joseph, husband of Mary and patron of Belgium, fathers, Happy Death, and Peru (among others)</a:t>
             </a:r>
             <a:endParaRPr lang="en-US" dirty="0"/>
           </a:p>
@@ -8569,13 +8533,20 @@
     </p:spTree>
     <p:extLst>
       <p:ext uri="{BB962C8B-B14F-4D97-AF65-F5344CB8AC3E}">
-        <p14:creationId xmlns:p14="http://schemas.microsoft.com/office/powerpoint/2010/main" val="2806388133"/>
+        <p14:creationId xmlns:p14="http://schemas.microsoft.com/office/powerpoint/2010/main" val="1280791579"/>
       </p:ext>
     </p:extLst>
   </p:cSld>
   <p:clrMapOvr>
     <a:masterClrMapping/>
   </p:clrMapOvr>
+  <p:timing>
+    <p:tnLst>
+      <p:par>
+        <p:cTn xmlns:p14="http://schemas.microsoft.com/office/powerpoint/2010/main" id="1" dur="indefinite" restart="never" nodeType="tmRoot"/>
+      </p:par>
+    </p:tnLst>
+  </p:timing>
 </p:sld>
 </file>
 
@@ -8613,7 +8584,7 @@
           <a:p>
             <a:r>
               <a:rPr lang="en-US" dirty="0" smtClean="0"/>
-              <a:t>3/31: St. Stephen of Mar Saba, hermit</a:t>
+              <a:t>3/24: St. Catherine of Genoa</a:t>
             </a:r>
             <a:endParaRPr lang="en-US" dirty="0"/>
           </a:p>
@@ -8641,7 +8612,7 @@
     </p:spTree>
     <p:extLst>
       <p:ext uri="{BB962C8B-B14F-4D97-AF65-F5344CB8AC3E}">
-        <p14:creationId xmlns:p14="http://schemas.microsoft.com/office/powerpoint/2010/main" val="2534550404"/>
+        <p14:creationId xmlns:p14="http://schemas.microsoft.com/office/powerpoint/2010/main" val="1009385447"/>
       </p:ext>
     </p:extLst>
   </p:cSld>
@@ -8686,8 +8657,31 @@
           <a:lstStyle/>
           <a:p>
             <a:r>
+              <a:rPr lang="en-US" dirty="0"/>
+              <a:t>3/26: </a:t>
+            </a:r>
+            <a:r>
               <a:rPr lang="en-US" dirty="0" smtClean="0"/>
-              <a:t>4/2: St. Francis of Paola, patron of sailors and founder of  Hermits of St. Francis of Assisi</a:t>
+              <a:t>(no feast)</a:t>
+            </a:r>
+            <a:br>
+              <a:rPr lang="en-US" dirty="0" smtClean="0"/>
+            </a:br>
+            <a:r>
+              <a:rPr lang="en-US" dirty="0" smtClean="0"/>
+              <a:t>Blessed </a:t>
+            </a:r>
+            <a:r>
+              <a:rPr lang="en-US" dirty="0" err="1"/>
+              <a:t>Didacus</a:t>
+            </a:r>
+            <a:r>
+              <a:rPr lang="en-US" dirty="0"/>
+              <a:t> Joseph of </a:t>
+            </a:r>
+            <a:r>
+              <a:rPr lang="en-US" dirty="0" smtClean="0"/>
+              <a:t>Cadiz, preacher</a:t>
             </a:r>
             <a:endParaRPr lang="en-US" dirty="0"/>
           </a:p>
@@ -8715,7 +8709,7 @@
     </p:spTree>
     <p:extLst>
       <p:ext uri="{BB962C8B-B14F-4D97-AF65-F5344CB8AC3E}">
-        <p14:creationId xmlns:p14="http://schemas.microsoft.com/office/powerpoint/2010/main" val="3138794061"/>
+        <p14:creationId xmlns:p14="http://schemas.microsoft.com/office/powerpoint/2010/main" val="2806388133"/>
       </p:ext>
     </p:extLst>
   </p:cSld>
@@ -8754,14 +8748,12 @@
         </p:nvSpPr>
         <p:spPr/>
         <p:txBody>
-          <a:bodyPr>
-            <a:normAutofit fontScale="90000"/>
-          </a:bodyPr>
+          <a:bodyPr/>
           <a:lstStyle/>
           <a:p>
             <a:r>
               <a:rPr lang="en-US" dirty="0" smtClean="0"/>
-              <a:t>4/7: St. John Baptist de la Salle, patron saint of teachers, founder of Christian Brothers</a:t>
+              <a:t>3/31: St. Stephen of Mar Saba, hermit</a:t>
             </a:r>
             <a:endParaRPr lang="en-US" dirty="0"/>
           </a:p>
@@ -8789,7 +8781,7 @@
     </p:spTree>
     <p:extLst>
       <p:ext uri="{BB962C8B-B14F-4D97-AF65-F5344CB8AC3E}">
-        <p14:creationId xmlns:p14="http://schemas.microsoft.com/office/powerpoint/2010/main" val="1681306369"/>
+        <p14:creationId xmlns:p14="http://schemas.microsoft.com/office/powerpoint/2010/main" val="2534550404"/>
       </p:ext>
     </p:extLst>
   </p:cSld>
@@ -8956,20 +8948,14 @@
         </p:nvSpPr>
         <p:spPr/>
         <p:txBody>
-          <a:bodyPr/>
+          <a:bodyPr>
+            <a:normAutofit fontScale="90000"/>
+          </a:bodyPr>
           <a:lstStyle/>
           <a:p>
             <a:r>
               <a:rPr lang="en-US" dirty="0" smtClean="0"/>
-              <a:t>4/9: St. </a:t>
-            </a:r>
-            <a:r>
-              <a:rPr lang="en-US" dirty="0" err="1" smtClean="0"/>
-              <a:t>Casilda</a:t>
-            </a:r>
-            <a:r>
-              <a:rPr lang="en-US" dirty="0" smtClean="0"/>
-              <a:t>, convert</a:t>
+              <a:t>4/2: St. Francis of Paola, patron of sailors and founder of  Hermits of St. Francis of Assisi</a:t>
             </a:r>
             <a:endParaRPr lang="en-US" dirty="0"/>
           </a:p>
@@ -8997,7 +8983,7 @@
     </p:spTree>
     <p:extLst>
       <p:ext uri="{BB962C8B-B14F-4D97-AF65-F5344CB8AC3E}">
-        <p14:creationId xmlns:p14="http://schemas.microsoft.com/office/powerpoint/2010/main" val="1705376355"/>
+        <p14:creationId xmlns:p14="http://schemas.microsoft.com/office/powerpoint/2010/main" val="3138794061"/>
       </p:ext>
     </p:extLst>
   </p:cSld>
@@ -9043,7 +9029,7 @@
           <a:p>
             <a:r>
               <a:rPr lang="en-US" dirty="0" smtClean="0"/>
-              <a:t>4/14: Blessed Peter Gonzalez (another patron of sailors)</a:t>
+              <a:t>4/7: St. John Baptist de la Salle, patron saint of teachers, founder of Christian Brothers</a:t>
             </a:r>
             <a:endParaRPr lang="en-US" dirty="0"/>
           </a:p>
@@ -9071,7 +9057,7 @@
     </p:spTree>
     <p:extLst>
       <p:ext uri="{BB962C8B-B14F-4D97-AF65-F5344CB8AC3E}">
-        <p14:creationId xmlns:p14="http://schemas.microsoft.com/office/powerpoint/2010/main" val="1799302378"/>
+        <p14:creationId xmlns:p14="http://schemas.microsoft.com/office/powerpoint/2010/main" val="1681306369"/>
       </p:ext>
     </p:extLst>
   </p:cSld>
@@ -9115,11 +9101,15 @@
           <a:p>
             <a:r>
               <a:rPr lang="en-US" dirty="0" smtClean="0"/>
-              <a:t>4/16: St. Bernadette </a:t>
+              <a:t>4/9: St. </a:t>
             </a:r>
             <a:r>
               <a:rPr lang="en-US" dirty="0" err="1" smtClean="0"/>
-              <a:t>Soubiros</a:t>
+              <a:t>Casilda</a:t>
+            </a:r>
+            <a:r>
+              <a:rPr lang="en-US" dirty="0" smtClean="0"/>
+              <a:t>, convert</a:t>
             </a:r>
             <a:endParaRPr lang="en-US" dirty="0"/>
           </a:p>
@@ -9147,7 +9137,7 @@
     </p:spTree>
     <p:extLst>
       <p:ext uri="{BB962C8B-B14F-4D97-AF65-F5344CB8AC3E}">
-        <p14:creationId xmlns:p14="http://schemas.microsoft.com/office/powerpoint/2010/main" val="3496264965"/>
+        <p14:creationId xmlns:p14="http://schemas.microsoft.com/office/powerpoint/2010/main" val="1705376355"/>
       </p:ext>
     </p:extLst>
   </p:cSld>
@@ -9186,12 +9176,14 @@
         </p:nvSpPr>
         <p:spPr/>
         <p:txBody>
-          <a:bodyPr/>
+          <a:bodyPr>
+            <a:normAutofit fontScale="90000"/>
+          </a:bodyPr>
           <a:lstStyle/>
           <a:p>
             <a:r>
               <a:rPr lang="en-US" dirty="0" smtClean="0"/>
-              <a:t>4/21: St. Anselm, father of Scholasticism</a:t>
+              <a:t>4/14: Blessed Peter Gonzalez (another patron of sailors)</a:t>
             </a:r>
             <a:endParaRPr lang="en-US" dirty="0"/>
           </a:p>
@@ -9219,7 +9211,7 @@
     </p:spTree>
     <p:extLst>
       <p:ext uri="{BB962C8B-B14F-4D97-AF65-F5344CB8AC3E}">
-        <p14:creationId xmlns:p14="http://schemas.microsoft.com/office/powerpoint/2010/main" val="4284329308"/>
+        <p14:creationId xmlns:p14="http://schemas.microsoft.com/office/powerpoint/2010/main" val="1799302378"/>
       </p:ext>
     </p:extLst>
   </p:cSld>
@@ -9263,6 +9255,154 @@
           <a:p>
             <a:r>
               <a:rPr lang="en-US" dirty="0" smtClean="0"/>
+              <a:t>4/16: St. Bernadette </a:t>
+            </a:r>
+            <a:r>
+              <a:rPr lang="en-US" dirty="0" err="1" smtClean="0"/>
+              <a:t>Soubiros</a:t>
+            </a:r>
+            <a:endParaRPr lang="en-US" dirty="0"/>
+          </a:p>
+        </p:txBody>
+      </p:sp>
+      <p:sp>
+        <p:nvSpPr>
+          <p:cNvPr id="3" name="Text Placeholder 2"/>
+          <p:cNvSpPr>
+            <a:spLocks noGrp="1"/>
+          </p:cNvSpPr>
+          <p:nvPr>
+            <p:ph type="body" idx="1"/>
+          </p:nvPr>
+        </p:nvSpPr>
+        <p:spPr/>
+        <p:txBody>
+          <a:bodyPr/>
+          <a:lstStyle/>
+          <a:p>
+            <a:endParaRPr lang="en-US"/>
+          </a:p>
+        </p:txBody>
+      </p:sp>
+    </p:spTree>
+    <p:extLst>
+      <p:ext uri="{BB962C8B-B14F-4D97-AF65-F5344CB8AC3E}">
+        <p14:creationId xmlns:p14="http://schemas.microsoft.com/office/powerpoint/2010/main" val="3496264965"/>
+      </p:ext>
+    </p:extLst>
+  </p:cSld>
+  <p:clrMapOvr>
+    <a:masterClrMapping/>
+  </p:clrMapOvr>
+</p:sld>
+</file>
+
+<file path=ppt/slides/slide35.xml><?xml version="1.0" encoding="utf-8"?>
+<p:sld xmlns:a="http://schemas.openxmlformats.org/drawingml/2006/main" xmlns:r="http://schemas.openxmlformats.org/officeDocument/2006/relationships" xmlns:p="http://schemas.openxmlformats.org/presentationml/2006/main">
+  <p:cSld>
+    <p:spTree>
+      <p:nvGrpSpPr>
+        <p:cNvPr id="1" name=""/>
+        <p:cNvGrpSpPr/>
+        <p:nvPr/>
+      </p:nvGrpSpPr>
+      <p:grpSpPr>
+        <a:xfrm>
+          <a:off x="0" y="0"/>
+          <a:ext cx="0" cy="0"/>
+          <a:chOff x="0" y="0"/>
+          <a:chExt cx="0" cy="0"/>
+        </a:xfrm>
+      </p:grpSpPr>
+      <p:sp>
+        <p:nvSpPr>
+          <p:cNvPr id="2" name="Title 1"/>
+          <p:cNvSpPr>
+            <a:spLocks noGrp="1"/>
+          </p:cNvSpPr>
+          <p:nvPr>
+            <p:ph type="title"/>
+          </p:nvPr>
+        </p:nvSpPr>
+        <p:spPr/>
+        <p:txBody>
+          <a:bodyPr/>
+          <a:lstStyle/>
+          <a:p>
+            <a:r>
+              <a:rPr lang="en-US" dirty="0" smtClean="0"/>
+              <a:t>4/21: St. Anselm, father of Scholasticism</a:t>
+            </a:r>
+            <a:endParaRPr lang="en-US" dirty="0"/>
+          </a:p>
+        </p:txBody>
+      </p:sp>
+      <p:sp>
+        <p:nvSpPr>
+          <p:cNvPr id="3" name="Text Placeholder 2"/>
+          <p:cNvSpPr>
+            <a:spLocks noGrp="1"/>
+          </p:cNvSpPr>
+          <p:nvPr>
+            <p:ph type="body" idx="1"/>
+          </p:nvPr>
+        </p:nvSpPr>
+        <p:spPr/>
+        <p:txBody>
+          <a:bodyPr/>
+          <a:lstStyle/>
+          <a:p>
+            <a:endParaRPr lang="en-US"/>
+          </a:p>
+        </p:txBody>
+      </p:sp>
+    </p:spTree>
+    <p:extLst>
+      <p:ext uri="{BB962C8B-B14F-4D97-AF65-F5344CB8AC3E}">
+        <p14:creationId xmlns:p14="http://schemas.microsoft.com/office/powerpoint/2010/main" val="4284329308"/>
+      </p:ext>
+    </p:extLst>
+  </p:cSld>
+  <p:clrMapOvr>
+    <a:masterClrMapping/>
+  </p:clrMapOvr>
+</p:sld>
+</file>
+
+<file path=ppt/slides/slide36.xml><?xml version="1.0" encoding="utf-8"?>
+<p:sld xmlns:a="http://schemas.openxmlformats.org/drawingml/2006/main" xmlns:r="http://schemas.openxmlformats.org/officeDocument/2006/relationships" xmlns:p="http://schemas.openxmlformats.org/presentationml/2006/main">
+  <p:cSld>
+    <p:spTree>
+      <p:nvGrpSpPr>
+        <p:cNvPr id="1" name=""/>
+        <p:cNvGrpSpPr/>
+        <p:nvPr/>
+      </p:nvGrpSpPr>
+      <p:grpSpPr>
+        <a:xfrm>
+          <a:off x="0" y="0"/>
+          <a:ext cx="0" cy="0"/>
+          <a:chOff x="0" y="0"/>
+          <a:chExt cx="0" cy="0"/>
+        </a:xfrm>
+      </p:grpSpPr>
+      <p:sp>
+        <p:nvSpPr>
+          <p:cNvPr id="2" name="Title 1"/>
+          <p:cNvSpPr>
+            <a:spLocks noGrp="1"/>
+          </p:cNvSpPr>
+          <p:nvPr>
+            <p:ph type="title"/>
+          </p:nvPr>
+        </p:nvSpPr>
+        <p:spPr/>
+        <p:txBody>
+          <a:bodyPr/>
+          <a:lstStyle/>
+          <a:p>
+            <a:r>
+              <a:rPr lang="en-US" dirty="0" smtClean="0"/>
               <a:t>2/23: St. George, martyr and patron of England, etc.)</a:t>
             </a:r>
             <a:endParaRPr lang="en-US" dirty="0"/>
@@ -9301,7 +9441,7 @@
 </p:sld>
 </file>
 
-<file path=ppt/slides/slide35.xml><?xml version="1.0" encoding="utf-8"?>
+<file path=ppt/slides/slide37.xml><?xml version="1.0" encoding="utf-8"?>
 <p:sld xmlns:a="http://schemas.openxmlformats.org/drawingml/2006/main" xmlns:r="http://schemas.openxmlformats.org/officeDocument/2006/relationships" xmlns:p="http://schemas.openxmlformats.org/presentationml/2006/main">
   <p:cSld>
     <p:spTree>
@@ -9400,168 +9540,82 @@
           <a:chExt cx="0" cy="0"/>
         </a:xfrm>
       </p:grpSpPr>
-      <p:pic>
-        <p:nvPicPr>
-          <p:cNvPr id="4" name="Picture 3"/>
-          <p:cNvPicPr>
-            <a:picLocks/>
-          </p:cNvPicPr>
-          <p:nvPr>
-            <p:custDataLst>
-              <p:tags r:id="rId1"/>
-            </p:custDataLst>
-          </p:nvPr>
-        </p:nvPicPr>
-        <p:blipFill>
-          <a:blip r:embed="rId4">
-            <a:extLst>
-              <a:ext uri="{28A0092B-C50C-407E-A947-70E740481C1C}">
-                <a14:useLocalDpi xmlns:a14="http://schemas.microsoft.com/office/drawing/2010/main" val="0"/>
-              </a:ext>
-            </a:extLst>
-          </a:blip>
-          <a:stretch>
-            <a:fillRect/>
-          </a:stretch>
-        </p:blipFill>
-        <p:spPr>
-          <a:xfrm>
-            <a:off x="366184" y="274638"/>
-            <a:ext cx="8411633" cy="6308725"/>
-          </a:xfrm>
-          <a:prstGeom prst="rect">
-            <a:avLst/>
-          </a:prstGeom>
-        </p:spPr>
-      </p:pic>
-      <p:sp>
-        <p:nvSpPr>
-          <p:cNvPr id="3" name="Rectangle 2">
-            <a:hlinkClick r:id="rId5"/>
-          </p:cNvPr>
-          <p:cNvSpPr/>
-          <p:nvPr/>
-        </p:nvSpPr>
-        <p:spPr>
-          <a:xfrm>
-            <a:off x="1863656" y="2266525"/>
-            <a:ext cx="2333023" cy="2054864"/>
-          </a:xfrm>
-          <a:prstGeom prst="rect">
-            <a:avLst/>
-          </a:prstGeom>
-          <a:noFill/>
-          <a:ln>
-            <a:noFill/>
-          </a:ln>
-        </p:spPr>
-        <p:style>
-          <a:lnRef idx="1">
-            <a:schemeClr val="accent1"/>
-          </a:lnRef>
-          <a:fillRef idx="3">
-            <a:schemeClr val="accent1"/>
-          </a:fillRef>
-          <a:effectRef idx="2">
-            <a:schemeClr val="accent1"/>
-          </a:effectRef>
-          <a:fontRef idx="minor">
-            <a:schemeClr val="lt1"/>
-          </a:fontRef>
-        </p:style>
-        <p:txBody>
-          <a:bodyPr rtlCol="0" anchor="ctr"/>
-          <a:lstStyle/>
-          <a:p>
-            <a:pPr algn="ctr"/>
+      <p:sp>
+        <p:nvSpPr>
+          <p:cNvPr id="2" name="Title 1"/>
+          <p:cNvSpPr>
+            <a:spLocks noGrp="1"/>
+          </p:cNvSpPr>
+          <p:nvPr>
+            <p:ph type="title"/>
+          </p:nvPr>
+        </p:nvSpPr>
+        <p:spPr/>
+        <p:txBody>
+          <a:bodyPr/>
+          <a:lstStyle/>
+          <a:p>
+            <a:r>
+              <a:rPr lang="en-US" dirty="0" smtClean="0"/>
+              <a:t>Topic</a:t>
+            </a:r>
             <a:endParaRPr lang="en-US" dirty="0"/>
           </a:p>
         </p:txBody>
       </p:sp>
       <p:sp>
         <p:nvSpPr>
-          <p:cNvPr id="5" name="Rectangle 4">
-            <a:hlinkClick r:id="rId6"/>
-          </p:cNvPr>
-          <p:cNvSpPr/>
-          <p:nvPr/>
-        </p:nvSpPr>
-        <p:spPr>
-          <a:xfrm>
-            <a:off x="4973258" y="4597460"/>
-            <a:ext cx="2191469" cy="370406"/>
-          </a:xfrm>
-          <a:prstGeom prst="rect">
-            <a:avLst/>
-          </a:prstGeom>
-          <a:noFill/>
-          <a:ln>
-            <a:noFill/>
-          </a:ln>
-        </p:spPr>
-        <p:style>
-          <a:lnRef idx="1">
-            <a:schemeClr val="accent1"/>
-          </a:lnRef>
-          <a:fillRef idx="3">
-            <a:schemeClr val="accent1"/>
-          </a:fillRef>
-          <a:effectRef idx="2">
-            <a:schemeClr val="accent1"/>
-          </a:effectRef>
-          <a:fontRef idx="minor">
-            <a:schemeClr val="lt1"/>
-          </a:fontRef>
-        </p:style>
-        <p:txBody>
-          <a:bodyPr rtlCol="0" anchor="ctr"/>
-          <a:lstStyle/>
-          <a:p>
-            <a:pPr algn="ctr"/>
-            <a:endParaRPr lang="en-US" dirty="0"/>
-          </a:p>
-        </p:txBody>
-      </p:sp>
-      <p:sp>
-        <p:nvSpPr>
-          <p:cNvPr id="7" name="Rectangle 6">
-            <a:hlinkClick r:id="rId7" action="ppaction://hlinkfile"/>
-          </p:cNvPr>
-          <p:cNvSpPr/>
-          <p:nvPr/>
-        </p:nvSpPr>
-        <p:spPr>
-          <a:xfrm>
-            <a:off x="2912827" y="5194487"/>
-            <a:ext cx="3313169" cy="370406"/>
-          </a:xfrm>
-          <a:prstGeom prst="rect">
-            <a:avLst/>
-          </a:prstGeom>
-          <a:noFill/>
-          <a:ln>
-            <a:noFill/>
-          </a:ln>
-        </p:spPr>
-        <p:style>
-          <a:lnRef idx="1">
-            <a:schemeClr val="accent1"/>
-          </a:lnRef>
-          <a:fillRef idx="3">
-            <a:schemeClr val="accent1"/>
-          </a:fillRef>
-          <a:effectRef idx="2">
-            <a:schemeClr val="accent1"/>
-          </a:effectRef>
-          <a:fontRef idx="minor">
-            <a:schemeClr val="lt1"/>
-          </a:fontRef>
-        </p:style>
-        <p:txBody>
-          <a:bodyPr rtlCol="0" anchor="ctr"/>
-          <a:lstStyle/>
-          <a:p>
-            <a:pPr algn="ctr"/>
+          <p:cNvPr id="3" name="Content Placeholder 2"/>
+          <p:cNvSpPr>
+            <a:spLocks noGrp="1"/>
+          </p:cNvSpPr>
+          <p:nvPr>
+            <p:ph idx="1"/>
+          </p:nvPr>
+        </p:nvSpPr>
+        <p:spPr/>
+        <p:txBody>
+          <a:bodyPr/>
+          <a:lstStyle/>
+          <a:p>
+            <a:r>
+              <a:rPr lang="en-US" dirty="0" smtClean="0"/>
+              <a:t>A smallish demo of</a:t>
+            </a:r>
+          </a:p>
+          <a:p>
+            <a:pPr lvl="1"/>
+            <a:r>
+              <a:rPr lang="en-US" dirty="0" err="1" smtClean="0"/>
+              <a:t>IPython</a:t>
+            </a:r>
+            <a:r>
+              <a:rPr lang="en-US" dirty="0" smtClean="0"/>
+              <a:t> notebook features and annoyances</a:t>
+            </a:r>
+          </a:p>
+          <a:p>
+            <a:pPr lvl="2"/>
+            <a:r>
+              <a:rPr lang="en-US" dirty="0" smtClean="0"/>
+              <a:t>Renaming notebooks and naming directories</a:t>
+            </a:r>
+          </a:p>
+          <a:p>
+            <a:pPr lvl="1"/>
+            <a:r>
+              <a:rPr lang="en-US" dirty="0" smtClean="0"/>
+              <a:t>Python features and exploratory use for a data-presentation task.</a:t>
+            </a:r>
+          </a:p>
+          <a:p>
+            <a:r>
+              <a:rPr lang="en-US" dirty="0" smtClean="0"/>
+              <a:t>Q&amp;A</a:t>
+            </a:r>
+          </a:p>
+          <a:p>
+            <a:pPr lvl="1"/>
             <a:endParaRPr lang="en-US" dirty="0"/>
           </a:p>
         </p:txBody>
@@ -9569,7 +9623,7 @@
     </p:spTree>
     <p:extLst>
       <p:ext uri="{BB962C8B-B14F-4D97-AF65-F5344CB8AC3E}">
-        <p14:creationId xmlns:p14="http://schemas.microsoft.com/office/powerpoint/2010/main" val="2366078944"/>
+        <p14:creationId xmlns:p14="http://schemas.microsoft.com/office/powerpoint/2010/main" val="171315793"/>
       </p:ext>
     </p:extLst>
   </p:cSld>
@@ -9620,7 +9674,7 @@
           <a:p>
             <a:r>
               <a:rPr lang="en-US" dirty="0" smtClean="0"/>
-              <a:t>Topic</a:t>
+              <a:t>Next Time</a:t>
             </a:r>
             <a:endParaRPr lang="en-US" dirty="0"/>
           </a:p>
@@ -9643,42 +9697,14 @@
           <a:p>
             <a:r>
               <a:rPr lang="en-US" dirty="0" smtClean="0"/>
-              <a:t>A smallish demo of</a:t>
-            </a:r>
-          </a:p>
-          <a:p>
-            <a:pPr lvl="1"/>
-            <a:r>
-              <a:rPr lang="en-US" dirty="0" err="1" smtClean="0"/>
-              <a:t>IPython</a:t>
-            </a:r>
+              <a:t>Another short demo</a:t>
+            </a:r>
+          </a:p>
+          <a:p>
             <a:r>
               <a:rPr lang="en-US" dirty="0" smtClean="0"/>
-              <a:t> notebook features and annoyances</a:t>
-            </a:r>
-          </a:p>
-          <a:p>
-            <a:pPr lvl="2"/>
-            <a:r>
-              <a:rPr lang="en-US" dirty="0" smtClean="0"/>
-              <a:t>Renaming notebooks and naming directories</a:t>
-            </a:r>
-          </a:p>
-          <a:p>
-            <a:pPr lvl="1"/>
-            <a:r>
-              <a:rPr lang="en-US" dirty="0" smtClean="0"/>
-              <a:t>Python features and exploratory use for a data-presentation task.</a:t>
-            </a:r>
-          </a:p>
-          <a:p>
-            <a:r>
-              <a:rPr lang="en-US" dirty="0" smtClean="0"/>
-              <a:t>Q&amp;A</a:t>
-            </a:r>
-          </a:p>
-          <a:p>
-            <a:pPr lvl="1"/>
+              <a:t>Data types and variables</a:t>
+            </a:r>
             <a:endParaRPr lang="en-US" dirty="0"/>
           </a:p>
         </p:txBody>
@@ -9686,20 +9712,13 @@
     </p:spTree>
     <p:extLst>
       <p:ext uri="{BB962C8B-B14F-4D97-AF65-F5344CB8AC3E}">
-        <p14:creationId xmlns:p14="http://schemas.microsoft.com/office/powerpoint/2010/main" val="171315793"/>
+        <p14:creationId xmlns:p14="http://schemas.microsoft.com/office/powerpoint/2010/main" val="4158461120"/>
       </p:ext>
     </p:extLst>
   </p:cSld>
   <p:clrMapOvr>
     <a:masterClrMapping/>
   </p:clrMapOvr>
-  <p:timing>
-    <p:tnLst>
-      <p:par>
-        <p:cTn xmlns:p14="http://schemas.microsoft.com/office/powerpoint/2010/main" id="1" dur="indefinite" restart="never" nodeType="tmRoot"/>
-      </p:par>
-    </p:tnLst>
-  </p:timing>
 </p:sld>
 </file>
 
@@ -9722,7 +9741,7 @@
       </p:grpSpPr>
       <p:sp>
         <p:nvSpPr>
-          <p:cNvPr id="2" name="Title 1"/>
+          <p:cNvPr id="4" name="Title 3"/>
           <p:cNvSpPr>
             <a:spLocks noGrp="1"/>
           </p:cNvSpPr>
@@ -9737,7 +9756,7 @@
           <a:p>
             <a:r>
               <a:rPr lang="en-US" dirty="0" smtClean="0"/>
-              <a:t>Next Time</a:t>
+              <a:t>1/15: St. Paul the Hermit</a:t>
             </a:r>
             <a:endParaRPr lang="en-US" dirty="0"/>
           </a:p>
@@ -9745,37 +9764,27 @@
       </p:sp>
       <p:sp>
         <p:nvSpPr>
-          <p:cNvPr id="3" name="Content Placeholder 2"/>
-          <p:cNvSpPr>
-            <a:spLocks noGrp="1"/>
-          </p:cNvSpPr>
-          <p:nvPr>
-            <p:ph idx="1"/>
-          </p:nvPr>
-        </p:nvSpPr>
-        <p:spPr/>
-        <p:txBody>
-          <a:bodyPr/>
-          <a:lstStyle/>
-          <a:p>
-            <a:r>
-              <a:rPr lang="en-US" dirty="0" smtClean="0"/>
-              <a:t>Another short demo</a:t>
-            </a:r>
-          </a:p>
-          <a:p>
-            <a:r>
-              <a:rPr lang="en-US" dirty="0" smtClean="0"/>
-              <a:t>Data types and variables</a:t>
-            </a:r>
-            <a:endParaRPr lang="en-US" dirty="0"/>
+          <p:cNvPr id="5" name="Text Placeholder 4"/>
+          <p:cNvSpPr>
+            <a:spLocks noGrp="1"/>
+          </p:cNvSpPr>
+          <p:nvPr>
+            <p:ph type="body" idx="1"/>
+          </p:nvPr>
+        </p:nvSpPr>
+        <p:spPr/>
+        <p:txBody>
+          <a:bodyPr/>
+          <a:lstStyle/>
+          <a:p>
+            <a:endParaRPr lang="en-US"/>
           </a:p>
         </p:txBody>
       </p:sp>
     </p:spTree>
     <p:extLst>
       <p:ext uri="{BB962C8B-B14F-4D97-AF65-F5344CB8AC3E}">
-        <p14:creationId xmlns:p14="http://schemas.microsoft.com/office/powerpoint/2010/main" val="4158461120"/>
+        <p14:creationId xmlns:p14="http://schemas.microsoft.com/office/powerpoint/2010/main" val="4015700827"/>
       </p:ext>
     </p:extLst>
   </p:cSld>
@@ -9819,7 +9828,7 @@
           <a:p>
             <a:r>
               <a:rPr lang="en-US" dirty="0" smtClean="0"/>
-              <a:t>1/15: St. Paul the Hermit</a:t>
+              <a:t>Recap 1/13</a:t>
             </a:r>
             <a:endParaRPr lang="en-US" dirty="0"/>
           </a:p>
@@ -9827,27 +9836,45 @@
       </p:sp>
       <p:sp>
         <p:nvSpPr>
-          <p:cNvPr id="5" name="Text Placeholder 4"/>
-          <p:cNvSpPr>
-            <a:spLocks noGrp="1"/>
-          </p:cNvSpPr>
-          <p:nvPr>
-            <p:ph type="body" idx="1"/>
-          </p:nvPr>
-        </p:nvSpPr>
-        <p:spPr/>
-        <p:txBody>
-          <a:bodyPr/>
-          <a:lstStyle/>
-          <a:p>
-            <a:endParaRPr lang="en-US"/>
+          <p:cNvPr id="5" name="Content Placeholder 4"/>
+          <p:cNvSpPr>
+            <a:spLocks noGrp="1"/>
+          </p:cNvSpPr>
+          <p:nvPr>
+            <p:ph idx="1"/>
+          </p:nvPr>
+        </p:nvSpPr>
+        <p:spPr/>
+        <p:txBody>
+          <a:bodyPr/>
+          <a:lstStyle/>
+          <a:p>
+            <a:r>
+              <a:rPr lang="en-US" dirty="0" smtClean="0"/>
+              <a:t>Class orientation</a:t>
+            </a:r>
+          </a:p>
+          <a:p>
+            <a:pPr lvl="1"/>
+            <a:r>
+              <a:rPr lang="en-US" dirty="0" smtClean="0"/>
+              <a:t>Bring laptops!</a:t>
+            </a:r>
+          </a:p>
+          <a:p>
+            <a:pPr lvl="1"/>
+            <a:r>
+              <a:rPr lang="en-US" dirty="0" smtClean="0"/>
+              <a:t>Some elements of Python (plotting)</a:t>
+            </a:r>
+            <a:endParaRPr lang="en-US" dirty="0"/>
           </a:p>
         </p:txBody>
       </p:sp>
     </p:spTree>
     <p:extLst>
       <p:ext uri="{BB962C8B-B14F-4D97-AF65-F5344CB8AC3E}">
-        <p14:creationId xmlns:p14="http://schemas.microsoft.com/office/powerpoint/2010/main" val="4015700827"/>
+        <p14:creationId xmlns:p14="http://schemas.microsoft.com/office/powerpoint/2010/main" val="269316557"/>
       </p:ext>
     </p:extLst>
   </p:cSld>
@@ -9874,46 +9901,168 @@
           <a:chExt cx="0" cy="0"/>
         </a:xfrm>
       </p:grpSpPr>
-      <p:sp>
-        <p:nvSpPr>
-          <p:cNvPr id="2" name="Title 1"/>
-          <p:cNvSpPr>
-            <a:spLocks noGrp="1"/>
-          </p:cNvSpPr>
-          <p:nvPr>
-            <p:ph type="title"/>
-          </p:nvPr>
-        </p:nvSpPr>
-        <p:spPr/>
-        <p:txBody>
-          <a:bodyPr>
-            <a:normAutofit/>
-          </a:bodyPr>
-          <a:lstStyle/>
-          <a:p>
-            <a:r>
-              <a:rPr lang="en-US" dirty="0" smtClean="0"/>
-              <a:t>1/20: Feast of St. Fabian, Pope and martyr</a:t>
-            </a:r>
+      <p:pic>
+        <p:nvPicPr>
+          <p:cNvPr id="4" name="Picture 3"/>
+          <p:cNvPicPr>
+            <a:picLocks/>
+          </p:cNvPicPr>
+          <p:nvPr>
+            <p:custDataLst>
+              <p:tags r:id="rId1"/>
+            </p:custDataLst>
+          </p:nvPr>
+        </p:nvPicPr>
+        <p:blipFill>
+          <a:blip r:embed="rId4">
+            <a:extLst>
+              <a:ext uri="{28A0092B-C50C-407E-A947-70E740481C1C}">
+                <a14:useLocalDpi xmlns:a14="http://schemas.microsoft.com/office/drawing/2010/main" val="0"/>
+              </a:ext>
+            </a:extLst>
+          </a:blip>
+          <a:stretch>
+            <a:fillRect/>
+          </a:stretch>
+        </p:blipFill>
+        <p:spPr>
+          <a:xfrm>
+            <a:off x="366184" y="274638"/>
+            <a:ext cx="8411633" cy="6308725"/>
+          </a:xfrm>
+          <a:prstGeom prst="rect">
+            <a:avLst/>
+          </a:prstGeom>
+        </p:spPr>
+      </p:pic>
+      <p:sp>
+        <p:nvSpPr>
+          <p:cNvPr id="3" name="Rectangle 2">
+            <a:hlinkClick r:id="rId5"/>
+          </p:cNvPr>
+          <p:cNvSpPr/>
+          <p:nvPr/>
+        </p:nvSpPr>
+        <p:spPr>
+          <a:xfrm>
+            <a:off x="1863656" y="2266525"/>
+            <a:ext cx="2333023" cy="2054864"/>
+          </a:xfrm>
+          <a:prstGeom prst="rect">
+            <a:avLst/>
+          </a:prstGeom>
+          <a:noFill/>
+          <a:ln>
+            <a:noFill/>
+          </a:ln>
+        </p:spPr>
+        <p:style>
+          <a:lnRef idx="1">
+            <a:schemeClr val="accent1"/>
+          </a:lnRef>
+          <a:fillRef idx="3">
+            <a:schemeClr val="accent1"/>
+          </a:fillRef>
+          <a:effectRef idx="2">
+            <a:schemeClr val="accent1"/>
+          </a:effectRef>
+          <a:fontRef idx="minor">
+            <a:schemeClr val="lt1"/>
+          </a:fontRef>
+        </p:style>
+        <p:txBody>
+          <a:bodyPr rtlCol="0" anchor="ctr"/>
+          <a:lstStyle/>
+          <a:p>
+            <a:pPr algn="ctr"/>
             <a:endParaRPr lang="en-US" dirty="0"/>
           </a:p>
         </p:txBody>
       </p:sp>
       <p:sp>
         <p:nvSpPr>
-          <p:cNvPr id="3" name="Text Placeholder 2"/>
-          <p:cNvSpPr>
-            <a:spLocks noGrp="1"/>
-          </p:cNvSpPr>
-          <p:nvPr>
-            <p:ph type="body" idx="1"/>
-          </p:nvPr>
-        </p:nvSpPr>
-        <p:spPr/>
-        <p:txBody>
-          <a:bodyPr/>
-          <a:lstStyle/>
-          <a:p>
+          <p:cNvPr id="5" name="Rectangle 4">
+            <a:hlinkClick r:id="rId6"/>
+          </p:cNvPr>
+          <p:cNvSpPr/>
+          <p:nvPr/>
+        </p:nvSpPr>
+        <p:spPr>
+          <a:xfrm>
+            <a:off x="4973258" y="4597460"/>
+            <a:ext cx="2191469" cy="370406"/>
+          </a:xfrm>
+          <a:prstGeom prst="rect">
+            <a:avLst/>
+          </a:prstGeom>
+          <a:noFill/>
+          <a:ln>
+            <a:noFill/>
+          </a:ln>
+        </p:spPr>
+        <p:style>
+          <a:lnRef idx="1">
+            <a:schemeClr val="accent1"/>
+          </a:lnRef>
+          <a:fillRef idx="3">
+            <a:schemeClr val="accent1"/>
+          </a:fillRef>
+          <a:effectRef idx="2">
+            <a:schemeClr val="accent1"/>
+          </a:effectRef>
+          <a:fontRef idx="minor">
+            <a:schemeClr val="lt1"/>
+          </a:fontRef>
+        </p:style>
+        <p:txBody>
+          <a:bodyPr rtlCol="0" anchor="ctr"/>
+          <a:lstStyle/>
+          <a:p>
+            <a:pPr algn="ctr"/>
+            <a:endParaRPr lang="en-US" dirty="0"/>
+          </a:p>
+        </p:txBody>
+      </p:sp>
+      <p:sp>
+        <p:nvSpPr>
+          <p:cNvPr id="7" name="Rectangle 6">
+            <a:hlinkClick r:id="rId7" action="ppaction://hlinkfile"/>
+          </p:cNvPr>
+          <p:cNvSpPr/>
+          <p:nvPr/>
+        </p:nvSpPr>
+        <p:spPr>
+          <a:xfrm>
+            <a:off x="2912827" y="5194487"/>
+            <a:ext cx="3313169" cy="370406"/>
+          </a:xfrm>
+          <a:prstGeom prst="rect">
+            <a:avLst/>
+          </a:prstGeom>
+          <a:noFill/>
+          <a:ln>
+            <a:noFill/>
+          </a:ln>
+        </p:spPr>
+        <p:style>
+          <a:lnRef idx="1">
+            <a:schemeClr val="accent1"/>
+          </a:lnRef>
+          <a:fillRef idx="3">
+            <a:schemeClr val="accent1"/>
+          </a:fillRef>
+          <a:effectRef idx="2">
+            <a:schemeClr val="accent1"/>
+          </a:effectRef>
+          <a:fontRef idx="minor">
+            <a:schemeClr val="lt1"/>
+          </a:fontRef>
+        </p:style>
+        <p:txBody>
+          <a:bodyPr rtlCol="0" anchor="ctr"/>
+          <a:lstStyle/>
+          <a:p>
+            <a:pPr algn="ctr"/>
             <a:endParaRPr lang="en-US" dirty="0"/>
           </a:p>
         </p:txBody>
@@ -9921,13 +10070,20 @@
     </p:spTree>
     <p:extLst>
       <p:ext uri="{BB962C8B-B14F-4D97-AF65-F5344CB8AC3E}">
-        <p14:creationId xmlns:p14="http://schemas.microsoft.com/office/powerpoint/2010/main" val="4090544002"/>
+        <p14:creationId xmlns:p14="http://schemas.microsoft.com/office/powerpoint/2010/main" val="2366078944"/>
       </p:ext>
     </p:extLst>
   </p:cSld>
   <p:clrMapOvr>
     <a:masterClrMapping/>
   </p:clrMapOvr>
+  <p:timing>
+    <p:tnLst>
+      <p:par>
+        <p:cTn xmlns:p14="http://schemas.microsoft.com/office/powerpoint/2010/main" id="1" dur="indefinite" restart="never" nodeType="tmRoot"/>
+      </p:par>
+    </p:tnLst>
+  </p:timing>
 </p:sld>
 </file>
 
@@ -9965,7 +10121,7 @@
           <a:p>
             <a:r>
               <a:rPr lang="en-US" dirty="0" smtClean="0"/>
-              <a:t>1/22: St. Vincent, martyr</a:t>
+              <a:t>Today’s topics</a:t>
             </a:r>
             <a:endParaRPr lang="en-US" dirty="0"/>
           </a:p>
@@ -9973,27 +10129,59 @@
       </p:sp>
       <p:sp>
         <p:nvSpPr>
-          <p:cNvPr id="3" name="Text Placeholder 2"/>
-          <p:cNvSpPr>
-            <a:spLocks noGrp="1"/>
-          </p:cNvSpPr>
-          <p:nvPr>
-            <p:ph type="body" idx="1"/>
-          </p:nvPr>
-        </p:nvSpPr>
-        <p:spPr/>
-        <p:txBody>
-          <a:bodyPr/>
-          <a:lstStyle/>
-          <a:p>
-            <a:endParaRPr lang="en-US"/>
+          <p:cNvPr id="3" name="Content Placeholder 2"/>
+          <p:cNvSpPr>
+            <a:spLocks noGrp="1"/>
+          </p:cNvSpPr>
+          <p:nvPr>
+            <p:ph idx="1"/>
+          </p:nvPr>
+        </p:nvSpPr>
+        <p:spPr/>
+        <p:txBody>
+          <a:bodyPr/>
+          <a:lstStyle/>
+          <a:p>
+            <a:r>
+              <a:rPr lang="en-US" dirty="0" smtClean="0"/>
+              <a:t>Python-as-calculator</a:t>
+            </a:r>
+          </a:p>
+          <a:p>
+            <a:r>
+              <a:rPr lang="en-US" dirty="0" smtClean="0"/>
+              <a:t>In-class activity with a live demo from a class participant</a:t>
+            </a:r>
+          </a:p>
+          <a:p>
+            <a:r>
+              <a:rPr lang="en-US" dirty="0" smtClean="0"/>
+              <a:t>More on the plotting demo</a:t>
+            </a:r>
+          </a:p>
+          <a:p>
+            <a:r>
+              <a:rPr lang="en-US" dirty="0" smtClean="0"/>
+              <a:t>Word-count demo</a:t>
+            </a:r>
+          </a:p>
+          <a:p>
+            <a:r>
+              <a:rPr lang="en-US" dirty="0" smtClean="0"/>
+              <a:t>Setting the stage </a:t>
+            </a:r>
+            <a:r>
+              <a:rPr lang="en-US" smtClean="0"/>
+              <a:t>for next week</a:t>
+            </a:r>
+            <a:endParaRPr lang="en-US" dirty="0" smtClean="0"/>
           </a:p>
         </p:txBody>
       </p:sp>
     </p:spTree>
     <p:extLst>
       <p:ext uri="{BB962C8B-B14F-4D97-AF65-F5344CB8AC3E}">
-        <p14:creationId xmlns:p14="http://schemas.microsoft.com/office/powerpoint/2010/main" val="167858628"/>
+        <p14:creationId xmlns:p14="http://schemas.microsoft.com/office/powerpoint/2010/main" val="2373726438"/>
       </p:ext>
     </p:extLst>
   </p:cSld>

</xml_diff>